<commit_message>
Test report is now finished
</commit_message>
<xml_diff>
--- a/Test rapport.pptx
+++ b/Test rapport.pptx
@@ -8,11 +8,14 @@
     <p:sldId id="256" r:id="rId2"/>
     <p:sldId id="257" r:id="rId3"/>
     <p:sldId id="258" r:id="rId4"/>
-    <p:sldId id="259" r:id="rId5"/>
-    <p:sldId id="260" r:id="rId6"/>
-    <p:sldId id="261" r:id="rId7"/>
-    <p:sldId id="262" r:id="rId8"/>
-    <p:sldId id="263" r:id="rId9"/>
+    <p:sldId id="267" r:id="rId5"/>
+    <p:sldId id="259" r:id="rId6"/>
+    <p:sldId id="260" r:id="rId7"/>
+    <p:sldId id="261" r:id="rId8"/>
+    <p:sldId id="265" r:id="rId9"/>
+    <p:sldId id="266" r:id="rId10"/>
+    <p:sldId id="262" r:id="rId11"/>
+    <p:sldId id="263" r:id="rId12"/>
   </p:sldIdLst>
   <p:sldSz cx="12192000" cy="6858000"/>
   <p:notesSz cx="6858000" cy="9144000"/>
@@ -392,6 +395,13 @@
             <a:schemeClr val="lt1"/>
           </a:fontRef>
         </p:style>
+        <p:txBody>
+          <a:bodyPr/>
+          <a:lstStyle/>
+          <a:p>
+            <a:endParaRPr lang="da-DK"/>
+          </a:p>
+        </p:txBody>
       </p:sp>
     </p:spTree>
     <p:extLst>
@@ -2873,6 +2883,13 @@
             <a:schemeClr val="lt1"/>
           </a:fontRef>
         </p:style>
+        <p:txBody>
+          <a:bodyPr/>
+          <a:lstStyle/>
+          <a:p>
+            <a:endParaRPr lang="da-DK"/>
+          </a:p>
+        </p:txBody>
       </p:sp>
       <p:sp>
         <p:nvSpPr>
@@ -4009,6 +4026,315 @@
 </p:sld>
 </file>
 
+<file path=ppt/slides/slide10.xml><?xml version="1.0" encoding="utf-8"?>
+<p:sld xmlns:a="http://schemas.openxmlformats.org/drawingml/2006/main" xmlns:r="http://schemas.openxmlformats.org/officeDocument/2006/relationships" xmlns:p="http://schemas.openxmlformats.org/presentationml/2006/main">
+  <p:cSld>
+    <p:spTree>
+      <p:nvGrpSpPr>
+        <p:cNvPr id="1" name=""/>
+        <p:cNvGrpSpPr/>
+        <p:nvPr/>
+      </p:nvGrpSpPr>
+      <p:grpSpPr>
+        <a:xfrm>
+          <a:off x="0" y="0"/>
+          <a:ext cx="0" cy="0"/>
+          <a:chOff x="0" y="0"/>
+          <a:chExt cx="0" cy="0"/>
+        </a:xfrm>
+      </p:grpSpPr>
+      <p:sp>
+        <p:nvSpPr>
+          <p:cNvPr id="2" name="Titel 1">
+            <a:extLst>
+              <a:ext uri="{FF2B5EF4-FFF2-40B4-BE49-F238E27FC236}">
+                <a16:creationId xmlns:a16="http://schemas.microsoft.com/office/drawing/2014/main" id="{C7981F0E-63FC-E7BF-0612-78BA5B79F85F}"/>
+              </a:ext>
+            </a:extLst>
+          </p:cNvPr>
+          <p:cNvSpPr>
+            <a:spLocks noGrp="1"/>
+          </p:cNvSpPr>
+          <p:nvPr>
+            <p:ph type="title"/>
+          </p:nvPr>
+        </p:nvSpPr>
+        <p:spPr/>
+        <p:txBody>
+          <a:bodyPr/>
+          <a:lstStyle/>
+          <a:p>
+            <a:r>
+              <a:rPr lang="da-DK" dirty="0"/>
+              <a:t>Konklusion</a:t>
+            </a:r>
+          </a:p>
+        </p:txBody>
+      </p:sp>
+      <p:sp>
+        <p:nvSpPr>
+          <p:cNvPr id="3" name="Pladsholder til indhold 2">
+            <a:extLst>
+              <a:ext uri="{FF2B5EF4-FFF2-40B4-BE49-F238E27FC236}">
+                <a16:creationId xmlns:a16="http://schemas.microsoft.com/office/drawing/2014/main" id="{2FA8A259-BC4B-6CC9-3854-F18D73D774AA}"/>
+              </a:ext>
+            </a:extLst>
+          </p:cNvPr>
+          <p:cNvSpPr>
+            <a:spLocks noGrp="1"/>
+          </p:cNvSpPr>
+          <p:nvPr>
+            <p:ph idx="1"/>
+          </p:nvPr>
+        </p:nvSpPr>
+        <p:spPr/>
+        <p:txBody>
+          <a:bodyPr/>
+          <a:lstStyle/>
+          <a:p>
+            <a:r>
+              <a:rPr lang="da-DK" dirty="0"/>
+              <a:t>Kode:</a:t>
+            </a:r>
+          </a:p>
+          <a:p>
+            <a:pPr lvl="1"/>
+            <a:r>
+              <a:rPr lang="da-DK" dirty="0"/>
+              <a:t>Velstruktureret.</a:t>
+            </a:r>
+          </a:p>
+          <a:p>
+            <a:pPr lvl="1"/>
+            <a:r>
+              <a:rPr lang="da-DK" dirty="0"/>
+              <a:t>Let forståelig.</a:t>
+            </a:r>
+          </a:p>
+          <a:p>
+            <a:pPr lvl="1"/>
+            <a:r>
+              <a:rPr lang="da-DK" dirty="0"/>
+              <a:t>Godt dokumenteret.</a:t>
+            </a:r>
+          </a:p>
+          <a:p>
+            <a:r>
+              <a:rPr lang="da-DK" dirty="0"/>
+              <a:t>Fejl og mangler.</a:t>
+            </a:r>
+          </a:p>
+          <a:p>
+            <a:pPr lvl="1"/>
+            <a:r>
+              <a:rPr lang="da-DK" dirty="0"/>
+              <a:t>Linje 141, </a:t>
+            </a:r>
+            <a:r>
+              <a:rPr lang="da-DK" dirty="0" err="1"/>
+              <a:t>download_task</a:t>
+            </a:r>
+            <a:r>
+              <a:rPr lang="da-DK" dirty="0"/>
+              <a:t>: </a:t>
+            </a:r>
+            <a:r>
+              <a:rPr lang="da-DK" dirty="0" err="1"/>
+              <a:t>NoneType</a:t>
+            </a:r>
+            <a:r>
+              <a:rPr lang="da-DK" dirty="0"/>
+              <a:t> bliver ikke håndteret ordentligt.</a:t>
+            </a:r>
+          </a:p>
+          <a:p>
+            <a:pPr lvl="1"/>
+            <a:r>
+              <a:rPr lang="da-DK" dirty="0"/>
+              <a:t>Linje 129, </a:t>
+            </a:r>
+            <a:r>
+              <a:rPr lang="da-DK" dirty="0" err="1"/>
+              <a:t>download_task</a:t>
+            </a:r>
+            <a:r>
+              <a:rPr lang="da-DK" dirty="0"/>
+              <a:t>: Skrivning til rapport fejler, da der ikke er defineret noget </a:t>
+            </a:r>
+            <a:r>
+              <a:rPr lang="da-DK" dirty="0" err="1"/>
+              <a:t>report_writer</a:t>
+            </a:r>
+            <a:r>
+              <a:rPr lang="da-DK" dirty="0"/>
+              <a:t> objekt. </a:t>
+            </a:r>
+          </a:p>
+          <a:p>
+            <a:pPr lvl="1"/>
+            <a:r>
+              <a:rPr lang="da-DK" dirty="0"/>
+              <a:t>Linje 250, </a:t>
+            </a:r>
+            <a:r>
+              <a:rPr lang="da-DK" dirty="0" err="1"/>
+              <a:t>summarize_download</a:t>
+            </a:r>
+            <a:r>
+              <a:rPr lang="da-DK" dirty="0"/>
+              <a:t>: Fejl grundet at summary er tom.</a:t>
+            </a:r>
+          </a:p>
+        </p:txBody>
+      </p:sp>
+    </p:spTree>
+    <p:extLst>
+      <p:ext uri="{BB962C8B-B14F-4D97-AF65-F5344CB8AC3E}">
+        <p14:creationId xmlns:p14="http://schemas.microsoft.com/office/powerpoint/2010/main" val="3649170967"/>
+      </p:ext>
+    </p:extLst>
+  </p:cSld>
+  <p:clrMapOvr>
+    <a:masterClrMapping/>
+  </p:clrMapOvr>
+  <p:transition spd="med">
+    <p:pull/>
+  </p:transition>
+</p:sld>
+</file>
+
+<file path=ppt/slides/slide11.xml><?xml version="1.0" encoding="utf-8"?>
+<p:sld xmlns:a="http://schemas.openxmlformats.org/drawingml/2006/main" xmlns:r="http://schemas.openxmlformats.org/officeDocument/2006/relationships" xmlns:p="http://schemas.openxmlformats.org/presentationml/2006/main">
+  <p:cSld>
+    <p:spTree>
+      <p:nvGrpSpPr>
+        <p:cNvPr id="1" name=""/>
+        <p:cNvGrpSpPr/>
+        <p:nvPr/>
+      </p:nvGrpSpPr>
+      <p:grpSpPr>
+        <a:xfrm>
+          <a:off x="0" y="0"/>
+          <a:ext cx="0" cy="0"/>
+          <a:chOff x="0" y="0"/>
+          <a:chExt cx="0" cy="0"/>
+        </a:xfrm>
+      </p:grpSpPr>
+      <p:sp>
+        <p:nvSpPr>
+          <p:cNvPr id="2" name="Titel 1">
+            <a:extLst>
+              <a:ext uri="{FF2B5EF4-FFF2-40B4-BE49-F238E27FC236}">
+                <a16:creationId xmlns:a16="http://schemas.microsoft.com/office/drawing/2014/main" id="{CFE4E1AA-BCF8-467C-3CD8-56DE8896EF7C}"/>
+              </a:ext>
+            </a:extLst>
+          </p:cNvPr>
+          <p:cNvSpPr>
+            <a:spLocks noGrp="1"/>
+          </p:cNvSpPr>
+          <p:nvPr>
+            <p:ph type="title"/>
+          </p:nvPr>
+        </p:nvSpPr>
+        <p:spPr/>
+        <p:txBody>
+          <a:bodyPr/>
+          <a:lstStyle/>
+          <a:p>
+            <a:r>
+              <a:rPr lang="da-DK" dirty="0"/>
+              <a:t>Tak for denne gang</a:t>
+            </a:r>
+          </a:p>
+        </p:txBody>
+      </p:sp>
+      <p:pic>
+        <p:nvPicPr>
+          <p:cNvPr id="5" name="Pladsholder til indhold 4" descr="Et billede, der indeholder tekst, person, Små til mellemstore katte, smil&#10;&#10;AI-genereret indhold kan være ukorrekt.">
+            <a:extLst>
+              <a:ext uri="{FF2B5EF4-FFF2-40B4-BE49-F238E27FC236}">
+                <a16:creationId xmlns:a16="http://schemas.microsoft.com/office/drawing/2014/main" id="{1579E88C-699E-CD58-888C-49D53E41F960}"/>
+              </a:ext>
+            </a:extLst>
+          </p:cNvPr>
+          <p:cNvPicPr>
+            <a:picLocks noGrp="1" noChangeAspect="1"/>
+          </p:cNvPicPr>
+          <p:nvPr>
+            <p:ph idx="1"/>
+          </p:nvPr>
+        </p:nvPicPr>
+        <p:blipFill>
+          <a:blip r:embed="rId2">
+            <a:extLst>
+              <a:ext uri="{28A0092B-C50C-407E-A947-70E740481C1C}">
+                <a14:useLocalDpi xmlns:a14="http://schemas.microsoft.com/office/drawing/2010/main" val="0"/>
+              </a:ext>
+            </a:extLst>
+          </a:blip>
+          <a:stretch>
+            <a:fillRect/>
+          </a:stretch>
+        </p:blipFill>
+        <p:spPr>
+          <a:xfrm>
+            <a:off x="325721" y="1868129"/>
+            <a:ext cx="6318196" cy="4351338"/>
+          </a:xfrm>
+        </p:spPr>
+      </p:pic>
+      <p:pic>
+        <p:nvPicPr>
+          <p:cNvPr id="7" name="Billede 6" descr="Et billede, der indeholder tekst, tegneserie, køretøj, Fiktiv figur&#10;&#10;AI-genereret indhold kan være ukorrekt.">
+            <a:extLst>
+              <a:ext uri="{FF2B5EF4-FFF2-40B4-BE49-F238E27FC236}">
+                <a16:creationId xmlns:a16="http://schemas.microsoft.com/office/drawing/2014/main" id="{F728B190-AEAC-5663-EA35-E6FC04C25DCD}"/>
+              </a:ext>
+            </a:extLst>
+          </p:cNvPr>
+          <p:cNvPicPr>
+            <a:picLocks noChangeAspect="1"/>
+          </p:cNvPicPr>
+          <p:nvPr/>
+        </p:nvPicPr>
+        <p:blipFill>
+          <a:blip r:embed="rId3">
+            <a:extLst>
+              <a:ext uri="{28A0092B-C50C-407E-A947-70E740481C1C}">
+                <a14:useLocalDpi xmlns:a14="http://schemas.microsoft.com/office/drawing/2010/main" val="0"/>
+              </a:ext>
+            </a:extLst>
+          </a:blip>
+          <a:stretch>
+            <a:fillRect/>
+          </a:stretch>
+        </p:blipFill>
+        <p:spPr>
+          <a:xfrm>
+            <a:off x="6722575" y="1868129"/>
+            <a:ext cx="4458023" cy="4513288"/>
+          </a:xfrm>
+          <a:prstGeom prst="rect">
+            <a:avLst/>
+          </a:prstGeom>
+        </p:spPr>
+      </p:pic>
+    </p:spTree>
+    <p:extLst>
+      <p:ext uri="{BB962C8B-B14F-4D97-AF65-F5344CB8AC3E}">
+        <p14:creationId xmlns:p14="http://schemas.microsoft.com/office/powerpoint/2010/main" val="3102309526"/>
+      </p:ext>
+    </p:extLst>
+  </p:cSld>
+  <p:clrMapOvr>
+    <a:masterClrMapping/>
+  </p:clrMapOvr>
+  <p:transition spd="med">
+    <p:pull/>
+  </p:transition>
+</p:sld>
+</file>
+
 <file path=ppt/slides/slide2.xml><?xml version="1.0" encoding="utf-8"?>
 <p:sld xmlns:a="http://schemas.openxmlformats.org/drawingml/2006/main" xmlns:r="http://schemas.openxmlformats.org/officeDocument/2006/relationships" xmlns:p="http://schemas.openxmlformats.org/presentationml/2006/main">
   <p:cSld>
@@ -4078,6 +4404,12 @@
             <a:r>
               <a:rPr lang="da-DK" dirty="0"/>
               <a:t>Kodekvalitet</a:t>
+            </a:r>
+          </a:p>
+          <a:p>
+            <a:r>
+              <a:rPr lang="da-DK" dirty="0"/>
+              <a:t>Testmiljø</a:t>
             </a:r>
           </a:p>
           <a:p>
@@ -4275,7 +4607,7 @@
           <p:cNvPr id="2" name="Titel 1">
             <a:extLst>
               <a:ext uri="{FF2B5EF4-FFF2-40B4-BE49-F238E27FC236}">
-                <a16:creationId xmlns:a16="http://schemas.microsoft.com/office/drawing/2014/main" id="{345C2E80-63DC-B22B-CBC1-A3E5263DF95F}"/>
+                <a16:creationId xmlns:a16="http://schemas.microsoft.com/office/drawing/2014/main" id="{B15732FA-99F0-FD85-1717-F6F6A1ACE041}"/>
               </a:ext>
             </a:extLst>
           </p:cNvPr>
@@ -4293,145 +4625,47 @@
           <a:p>
             <a:r>
               <a:rPr lang="da-DK" dirty="0"/>
-              <a:t>Funktioner under test</a:t>
-            </a:r>
-          </a:p>
-        </p:txBody>
-      </p:sp>
-      <p:sp>
-        <p:nvSpPr>
-          <p:cNvPr id="3" name="Pladsholder til indhold 2">
+              <a:t>Testmiljø</a:t>
+            </a:r>
+          </a:p>
+        </p:txBody>
+      </p:sp>
+      <p:pic>
+        <p:nvPicPr>
+          <p:cNvPr id="4" name="Pladsholder til indhold 3">
             <a:extLst>
               <a:ext uri="{FF2B5EF4-FFF2-40B4-BE49-F238E27FC236}">
-                <a16:creationId xmlns:a16="http://schemas.microsoft.com/office/drawing/2014/main" id="{EC31C1C9-8B40-8D53-0097-848A6BEB675A}"/>
+                <a16:creationId xmlns:a16="http://schemas.microsoft.com/office/drawing/2014/main" id="{A150F7FC-F6B0-A2D4-FDAA-CACF27E9E43C}"/>
               </a:ext>
             </a:extLst>
           </p:cNvPr>
-          <p:cNvSpPr>
-            <a:spLocks noGrp="1"/>
-          </p:cNvSpPr>
+          <p:cNvPicPr>
+            <a:picLocks noGrp="1" noChangeAspect="1"/>
+          </p:cNvPicPr>
           <p:nvPr>
             <p:ph idx="1"/>
           </p:nvPr>
-        </p:nvSpPr>
-        <p:spPr/>
-        <p:txBody>
-          <a:bodyPr/>
-          <a:lstStyle/>
-          <a:p>
-            <a:r>
-              <a:rPr lang="da-DK" dirty="0"/>
-              <a:t>8 funktioner under test:</a:t>
-            </a:r>
-          </a:p>
-          <a:p>
-            <a:pPr marL="617220" lvl="1" indent="-342900">
-              <a:buFont typeface="+mj-lt"/>
-              <a:buAutoNum type="arabicPeriod"/>
-            </a:pPr>
-            <a:r>
-              <a:rPr lang="en-US" dirty="0" err="1"/>
-              <a:t>prepare_folders_and_find_pdf_duplicates</a:t>
-            </a:r>
-            <a:endParaRPr lang="en-US" dirty="0"/>
-          </a:p>
-          <a:p>
-            <a:pPr marL="617220" lvl="1" indent="-342900">
-              <a:buFont typeface="+mj-lt"/>
-              <a:buAutoNum type="arabicPeriod"/>
-            </a:pPr>
-            <a:r>
-              <a:rPr lang="en-US" dirty="0" err="1"/>
-              <a:t>load_and_filter_excel_data</a:t>
-            </a:r>
-            <a:endParaRPr lang="en-US" dirty="0"/>
-          </a:p>
-          <a:p>
-            <a:pPr marL="617220" lvl="1" indent="-342900">
-              <a:buFont typeface="+mj-lt"/>
-              <a:buAutoNum type="arabicPeriod"/>
-            </a:pPr>
-            <a:r>
-              <a:rPr lang="da-DK" dirty="0" err="1"/>
-              <a:t>download_pdf</a:t>
-            </a:r>
-            <a:endParaRPr lang="da-DK" dirty="0"/>
-          </a:p>
-          <a:p>
-            <a:pPr marL="617220" lvl="1" indent="-342900">
-              <a:buFont typeface="+mj-lt"/>
-              <a:buAutoNum type="arabicPeriod"/>
-            </a:pPr>
-            <a:r>
-              <a:rPr lang="da-DK" dirty="0" err="1"/>
-              <a:t>process_downloads_threaded</a:t>
-            </a:r>
-            <a:endParaRPr lang="da-DK" dirty="0"/>
-          </a:p>
-          <a:p>
-            <a:pPr marL="617220" lvl="1" indent="-342900">
-              <a:buFont typeface="+mj-lt"/>
-              <a:buAutoNum type="arabicPeriod"/>
-            </a:pPr>
-            <a:r>
-              <a:rPr lang="da-DK" dirty="0" err="1"/>
-              <a:t>delete_downloaded_files</a:t>
-            </a:r>
-            <a:endParaRPr lang="da-DK" dirty="0"/>
-          </a:p>
-          <a:p>
-            <a:pPr marL="617220" lvl="1" indent="-342900">
-              <a:buFont typeface="+mj-lt"/>
-              <a:buAutoNum type="arabicPeriod"/>
-            </a:pPr>
-            <a:r>
-              <a:rPr lang="da-DK" dirty="0" err="1"/>
-              <a:t>summarize_downloads</a:t>
-            </a:r>
-            <a:endParaRPr lang="da-DK" dirty="0"/>
-          </a:p>
-          <a:p>
-            <a:pPr marL="617220" lvl="1" indent="-342900">
-              <a:buFont typeface="+mj-lt"/>
-              <a:buAutoNum type="arabicPeriod"/>
-            </a:pPr>
-            <a:r>
-              <a:rPr lang="da-DK" dirty="0" err="1"/>
-              <a:t>clean_report_file</a:t>
-            </a:r>
-            <a:endParaRPr lang="da-DK" dirty="0"/>
-          </a:p>
-          <a:p>
-            <a:pPr marL="617220" lvl="1" indent="-342900">
-              <a:buFont typeface="+mj-lt"/>
-              <a:buAutoNum type="arabicPeriod"/>
-            </a:pPr>
-            <a:r>
-              <a:rPr lang="da-DK" dirty="0" err="1"/>
-              <a:t>write_to_report</a:t>
-            </a:r>
-            <a:endParaRPr lang="da-DK" dirty="0"/>
-          </a:p>
-          <a:p>
-            <a:pPr marL="617220" lvl="1" indent="-342900">
-              <a:buFont typeface="+mj-lt"/>
-              <a:buAutoNum type="arabicPeriod"/>
-            </a:pPr>
-            <a:endParaRPr lang="en-US" dirty="0"/>
-          </a:p>
-          <a:p>
-            <a:pPr marL="617220" lvl="1" indent="-342900">
-              <a:buFont typeface="+mj-lt"/>
-              <a:buAutoNum type="arabicPeriod"/>
-            </a:pPr>
-            <a:endParaRPr lang="da-DK" dirty="0"/>
-          </a:p>
-        </p:txBody>
-      </p:sp>
+        </p:nvPicPr>
+        <p:blipFill>
+          <a:blip r:embed="rId2"/>
+          <a:stretch>
+            <a:fillRect/>
+          </a:stretch>
+        </p:blipFill>
+        <p:spPr>
+          <a:xfrm>
+            <a:off x="2498471" y="2603913"/>
+            <a:ext cx="6121908" cy="2801112"/>
+          </a:xfrm>
+          <a:prstGeom prst="rect">
+            <a:avLst/>
+          </a:prstGeom>
+        </p:spPr>
+      </p:pic>
     </p:spTree>
     <p:extLst>
       <p:ext uri="{BB962C8B-B14F-4D97-AF65-F5344CB8AC3E}">
-        <p14:creationId xmlns:p14="http://schemas.microsoft.com/office/powerpoint/2010/main" val="451277707"/>
+        <p14:creationId xmlns:p14="http://schemas.microsoft.com/office/powerpoint/2010/main" val="4269274848"/>
       </p:ext>
     </p:extLst>
   </p:cSld>
@@ -4466,7 +4700,7 @@
           <p:cNvPr id="2" name="Titel 1">
             <a:extLst>
               <a:ext uri="{FF2B5EF4-FFF2-40B4-BE49-F238E27FC236}">
-                <a16:creationId xmlns:a16="http://schemas.microsoft.com/office/drawing/2014/main" id="{24E1A95D-DB96-A517-3835-28C4ECB751DC}"/>
+                <a16:creationId xmlns:a16="http://schemas.microsoft.com/office/drawing/2014/main" id="{345C2E80-63DC-B22B-CBC1-A3E5263DF95F}"/>
               </a:ext>
             </a:extLst>
           </p:cNvPr>
@@ -4484,7 +4718,7 @@
           <a:p>
             <a:r>
               <a:rPr lang="da-DK" dirty="0"/>
-              <a:t>Design af test</a:t>
+              <a:t>Funktioner under test</a:t>
             </a:r>
           </a:p>
         </p:txBody>
@@ -4494,7 +4728,7 @@
           <p:cNvPr id="3" name="Pladsholder til indhold 2">
             <a:extLst>
               <a:ext uri="{FF2B5EF4-FFF2-40B4-BE49-F238E27FC236}">
-                <a16:creationId xmlns:a16="http://schemas.microsoft.com/office/drawing/2014/main" id="{CC63B482-EF3F-EBDE-CB03-64817F6A5C35}"/>
+                <a16:creationId xmlns:a16="http://schemas.microsoft.com/office/drawing/2014/main" id="{EC31C1C9-8B40-8D53-0097-848A6BEB675A}"/>
               </a:ext>
             </a:extLst>
           </p:cNvPr>
@@ -4512,149 +4746,117 @@
           <a:p>
             <a:r>
               <a:rPr lang="da-DK" dirty="0"/>
-              <a:t>Unit tests for hver funktion.</a:t>
-            </a:r>
-          </a:p>
-          <a:p>
-            <a:pPr lvl="1"/>
+              <a:t>8 funktioner under test:</a:t>
+            </a:r>
+          </a:p>
+          <a:p>
+            <a:pPr marL="617220" lvl="1" indent="-342900">
+              <a:buFont typeface="+mj-lt"/>
+              <a:buAutoNum type="arabicPeriod"/>
+            </a:pPr>
+            <a:r>
+              <a:rPr lang="en-US" dirty="0" err="1"/>
+              <a:t>prepare_folders_and_find_pdf_duplicates</a:t>
+            </a:r>
+            <a:endParaRPr lang="en-US" dirty="0"/>
+          </a:p>
+          <a:p>
+            <a:pPr marL="617220" lvl="1" indent="-342900">
+              <a:buFont typeface="+mj-lt"/>
+              <a:buAutoNum type="arabicPeriod"/>
+            </a:pPr>
+            <a:r>
+              <a:rPr lang="en-US" dirty="0" err="1"/>
+              <a:t>load_and_filter_excel_data</a:t>
+            </a:r>
+            <a:endParaRPr lang="en-US" dirty="0"/>
+          </a:p>
+          <a:p>
+            <a:pPr marL="617220" lvl="1" indent="-342900">
+              <a:buFont typeface="+mj-lt"/>
+              <a:buAutoNum type="arabicPeriod"/>
+            </a:pPr>
             <a:r>
               <a:rPr lang="da-DK" dirty="0" err="1"/>
-              <a:t>assertEqual</a:t>
-            </a:r>
-            <a:r>
-              <a:rPr lang="da-DK" dirty="0"/>
-              <a:t> for outputs.</a:t>
-            </a:r>
-          </a:p>
-          <a:p>
-            <a:pPr lvl="1"/>
-            <a:r>
-              <a:rPr lang="da-DK" dirty="0"/>
-              <a:t>Patch til at efterligne alle forbindelser</a:t>
-            </a:r>
-          </a:p>
-          <a:p>
-            <a:pPr lvl="1"/>
-            <a:r>
-              <a:rPr lang="da-DK" dirty="0"/>
-              <a:t>Ikke godt design af tests</a:t>
-            </a:r>
-          </a:p>
-          <a:p>
-            <a:r>
-              <a:rPr lang="da-DK" dirty="0"/>
-              <a:t>Integration tests for alle </a:t>
-            </a:r>
+              <a:t>download_pdf</a:t>
+            </a:r>
+            <a:endParaRPr lang="da-DK" dirty="0"/>
+          </a:p>
+          <a:p>
+            <a:pPr marL="617220" lvl="1" indent="-342900">
+              <a:buFont typeface="+mj-lt"/>
+              <a:buAutoNum type="arabicPeriod"/>
+            </a:pPr>
             <a:r>
               <a:rPr lang="da-DK" dirty="0" err="1"/>
-              <a:t>fuktioner</a:t>
+              <a:t>process_downloads_threaded</a:t>
             </a:r>
             <a:endParaRPr lang="da-DK" dirty="0"/>
           </a:p>
           <a:p>
-            <a:pPr lvl="1"/>
+            <a:pPr marL="617220" lvl="1" indent="-342900">
+              <a:buFont typeface="+mj-lt"/>
+              <a:buAutoNum type="arabicPeriod"/>
+            </a:pPr>
+            <a:r>
+              <a:rPr lang="da-DK" dirty="0" err="1"/>
+              <a:t>delete_downloaded_files</a:t>
+            </a:r>
             <a:endParaRPr lang="da-DK" dirty="0"/>
           </a:p>
           <a:p>
-            <a:pPr lvl="1"/>
+            <a:pPr marL="617220" lvl="1" indent="-342900">
+              <a:buFont typeface="+mj-lt"/>
+              <a:buAutoNum type="arabicPeriod"/>
+            </a:pPr>
+            <a:r>
+              <a:rPr lang="da-DK" dirty="0" err="1"/>
+              <a:t>summarize_downloads</a:t>
+            </a:r>
             <a:endParaRPr lang="da-DK" dirty="0"/>
           </a:p>
-        </p:txBody>
-      </p:sp>
-      <p:pic>
-        <p:nvPicPr>
-          <p:cNvPr id="7" name="Billede 6">
-            <a:extLst>
-              <a:ext uri="{FF2B5EF4-FFF2-40B4-BE49-F238E27FC236}">
-                <a16:creationId xmlns:a16="http://schemas.microsoft.com/office/drawing/2014/main" id="{D3771D94-BC83-95A2-39F3-D4C4FC26E06D}"/>
-              </a:ext>
-            </a:extLst>
-          </p:cNvPr>
-          <p:cNvPicPr>
-            <a:picLocks noChangeAspect="1"/>
-          </p:cNvPicPr>
-          <p:nvPr/>
-        </p:nvPicPr>
-        <p:blipFill>
-          <a:blip r:embed="rId2"/>
-          <a:stretch>
-            <a:fillRect/>
-          </a:stretch>
-        </p:blipFill>
-        <p:spPr>
-          <a:xfrm>
-            <a:off x="670694" y="3862878"/>
-            <a:ext cx="9777715" cy="1552018"/>
-          </a:xfrm>
-          <a:prstGeom prst="rect">
-            <a:avLst/>
-          </a:prstGeom>
-        </p:spPr>
-      </p:pic>
-      <p:pic>
-        <p:nvPicPr>
-          <p:cNvPr id="9" name="Billede 8">
-            <a:extLst>
-              <a:ext uri="{FF2B5EF4-FFF2-40B4-BE49-F238E27FC236}">
-                <a16:creationId xmlns:a16="http://schemas.microsoft.com/office/drawing/2014/main" id="{E44610FF-1945-2D4B-F52A-C1307B25909A}"/>
-              </a:ext>
-            </a:extLst>
-          </p:cNvPr>
-          <p:cNvPicPr>
-            <a:picLocks noChangeAspect="1"/>
-          </p:cNvPicPr>
-          <p:nvPr/>
-        </p:nvPicPr>
-        <p:blipFill>
-          <a:blip r:embed="rId3"/>
-          <a:stretch>
-            <a:fillRect/>
-          </a:stretch>
-        </p:blipFill>
-        <p:spPr>
-          <a:xfrm>
-            <a:off x="150519" y="5552374"/>
-            <a:ext cx="11060068" cy="1028844"/>
-          </a:xfrm>
-          <a:prstGeom prst="rect">
-            <a:avLst/>
-          </a:prstGeom>
-        </p:spPr>
-      </p:pic>
-      <p:pic>
-        <p:nvPicPr>
-          <p:cNvPr id="11" name="Billede 10">
-            <a:extLst>
-              <a:ext uri="{FF2B5EF4-FFF2-40B4-BE49-F238E27FC236}">
-                <a16:creationId xmlns:a16="http://schemas.microsoft.com/office/drawing/2014/main" id="{3A4FDCFC-DDB2-572A-B34E-26F4A2E72F45}"/>
-              </a:ext>
-            </a:extLst>
-          </p:cNvPr>
-          <p:cNvPicPr>
-            <a:picLocks noChangeAspect="1"/>
-          </p:cNvPicPr>
-          <p:nvPr/>
-        </p:nvPicPr>
-        <p:blipFill>
-          <a:blip r:embed="rId4"/>
-          <a:stretch>
-            <a:fillRect/>
-          </a:stretch>
-        </p:blipFill>
-        <p:spPr>
-          <a:xfrm>
-            <a:off x="5680553" y="1739504"/>
-            <a:ext cx="4982270" cy="1390844"/>
-          </a:xfrm>
-          <a:prstGeom prst="rect">
-            <a:avLst/>
-          </a:prstGeom>
-        </p:spPr>
-      </p:pic>
+          <a:p>
+            <a:pPr marL="617220" lvl="1" indent="-342900">
+              <a:buFont typeface="+mj-lt"/>
+              <a:buAutoNum type="arabicPeriod"/>
+            </a:pPr>
+            <a:r>
+              <a:rPr lang="da-DK" dirty="0" err="1"/>
+              <a:t>clean_report_file</a:t>
+            </a:r>
+            <a:endParaRPr lang="da-DK" dirty="0"/>
+          </a:p>
+          <a:p>
+            <a:pPr marL="617220" lvl="1" indent="-342900">
+              <a:buFont typeface="+mj-lt"/>
+              <a:buAutoNum type="arabicPeriod"/>
+            </a:pPr>
+            <a:r>
+              <a:rPr lang="da-DK" dirty="0" err="1"/>
+              <a:t>write_to_report</a:t>
+            </a:r>
+            <a:endParaRPr lang="da-DK" dirty="0"/>
+          </a:p>
+          <a:p>
+            <a:pPr marL="617220" lvl="1" indent="-342900">
+              <a:buFont typeface="+mj-lt"/>
+              <a:buAutoNum type="arabicPeriod"/>
+            </a:pPr>
+            <a:endParaRPr lang="en-US" dirty="0"/>
+          </a:p>
+          <a:p>
+            <a:pPr marL="617220" lvl="1" indent="-342900">
+              <a:buFont typeface="+mj-lt"/>
+              <a:buAutoNum type="arabicPeriod"/>
+            </a:pPr>
+            <a:endParaRPr lang="da-DK" dirty="0"/>
+          </a:p>
+        </p:txBody>
+      </p:sp>
     </p:spTree>
     <p:extLst>
       <p:ext uri="{BB962C8B-B14F-4D97-AF65-F5344CB8AC3E}">
-        <p14:creationId xmlns:p14="http://schemas.microsoft.com/office/powerpoint/2010/main" val="1306872264"/>
+        <p14:creationId xmlns:p14="http://schemas.microsoft.com/office/powerpoint/2010/main" val="451277707"/>
       </p:ext>
     </p:extLst>
   </p:cSld>
@@ -4689,7 +4891,7 @@
           <p:cNvPr id="2" name="Titel 1">
             <a:extLst>
               <a:ext uri="{FF2B5EF4-FFF2-40B4-BE49-F238E27FC236}">
-                <a16:creationId xmlns:a16="http://schemas.microsoft.com/office/drawing/2014/main" id="{38752860-6311-C86E-476A-98C4FED77888}"/>
+                <a16:creationId xmlns:a16="http://schemas.microsoft.com/office/drawing/2014/main" id="{24E1A95D-DB96-A517-3835-28C4ECB751DC}"/>
               </a:ext>
             </a:extLst>
           </p:cNvPr>
@@ -4707,7 +4909,7 @@
           <a:p>
             <a:r>
               <a:rPr lang="da-DK" dirty="0"/>
-              <a:t>Testresultater</a:t>
+              <a:t>Design af test</a:t>
             </a:r>
           </a:p>
         </p:txBody>
@@ -4717,7 +4919,7 @@
           <p:cNvPr id="3" name="Pladsholder til indhold 2">
             <a:extLst>
               <a:ext uri="{FF2B5EF4-FFF2-40B4-BE49-F238E27FC236}">
-                <a16:creationId xmlns:a16="http://schemas.microsoft.com/office/drawing/2014/main" id="{A1432D90-DD4C-2C49-665F-959EBD0CF837}"/>
+                <a16:creationId xmlns:a16="http://schemas.microsoft.com/office/drawing/2014/main" id="{CC63B482-EF3F-EBDE-CB03-64817F6A5C35}"/>
               </a:ext>
             </a:extLst>
           </p:cNvPr>
@@ -4728,58 +4930,61 @@
             <p:ph idx="1"/>
           </p:nvPr>
         </p:nvSpPr>
-        <p:spPr>
-          <a:xfrm>
-            <a:off x="1261872" y="1828800"/>
-            <a:ext cx="3683754" cy="4351337"/>
-          </a:xfrm>
-        </p:spPr>
+        <p:spPr/>
         <p:txBody>
           <a:bodyPr/>
           <a:lstStyle/>
           <a:p>
             <a:r>
               <a:rPr lang="da-DK" dirty="0"/>
-              <a:t>8 unit tests.</a:t>
-            </a:r>
-          </a:p>
-          <a:p>
+              <a:t>Unit tests for hver funktion.</a:t>
+            </a:r>
+          </a:p>
+          <a:p>
+            <a:pPr lvl="1"/>
+            <a:r>
+              <a:rPr lang="da-DK" dirty="0" err="1"/>
+              <a:t>assertEqual</a:t>
+            </a:r>
             <a:r>
               <a:rPr lang="da-DK" dirty="0"/>
-              <a:t>4 integrationstests</a:t>
-            </a:r>
-          </a:p>
-          <a:p>
+              <a:t> for outputs.</a:t>
+            </a:r>
+          </a:p>
+          <a:p>
+            <a:pPr lvl="1"/>
             <a:r>
               <a:rPr lang="da-DK" dirty="0"/>
-              <a:t>Unit tests giver fejl grundet at funktionerne ikke giver </a:t>
+              <a:t>Patch til at efterligne alle forbindelser</a:t>
+            </a:r>
+          </a:p>
+          <a:p>
+            <a:r>
+              <a:rPr lang="da-DK" dirty="0"/>
+              <a:t>Integration tests for alle </a:t>
             </a:r>
             <a:r>
               <a:rPr lang="da-DK" dirty="0" err="1"/>
-              <a:t>exceptions</a:t>
-            </a:r>
-            <a:r>
-              <a:rPr lang="da-DK" dirty="0"/>
-              <a:t>.</a:t>
-            </a:r>
-          </a:p>
-          <a:p>
-            <a:r>
-              <a:rPr lang="da-DK" dirty="0"/>
-              <a:t>Integrationstests kører fint uden problemer</a:t>
-            </a:r>
-          </a:p>
-          <a:p>
+              <a:t>fuktioner</a:t>
+            </a:r>
+            <a:endParaRPr lang="da-DK" dirty="0"/>
+          </a:p>
+          <a:p>
+            <a:pPr lvl="1"/>
+            <a:endParaRPr lang="da-DK" dirty="0"/>
+          </a:p>
+          <a:p>
+            <a:pPr lvl="1"/>
             <a:endParaRPr lang="da-DK" dirty="0"/>
           </a:p>
         </p:txBody>
       </p:sp>
       <p:pic>
         <p:nvPicPr>
-          <p:cNvPr id="7" name="Billede 6">
+          <p:cNvPr id="11" name="Billede 10">
             <a:extLst>
               <a:ext uri="{FF2B5EF4-FFF2-40B4-BE49-F238E27FC236}">
-                <a16:creationId xmlns:a16="http://schemas.microsoft.com/office/drawing/2014/main" id="{5E99049E-E056-D99A-6B5F-11BDFD52C667}"/>
+                <a16:creationId xmlns:a16="http://schemas.microsoft.com/office/drawing/2014/main" id="{3A4FDCFC-DDB2-572A-B34E-26F4A2E72F45}"/>
               </a:ext>
             </a:extLst>
           </p:cNvPr>
@@ -4796,8 +5001,68 @@
         </p:blipFill>
         <p:spPr>
           <a:xfrm>
-            <a:off x="4855397" y="1941274"/>
-            <a:ext cx="5096586" cy="1952898"/>
+            <a:off x="5680553" y="1739504"/>
+            <a:ext cx="4982270" cy="1390844"/>
+          </a:xfrm>
+          <a:prstGeom prst="rect">
+            <a:avLst/>
+          </a:prstGeom>
+        </p:spPr>
+      </p:pic>
+      <p:pic>
+        <p:nvPicPr>
+          <p:cNvPr id="5" name="Billede 4">
+            <a:extLst>
+              <a:ext uri="{FF2B5EF4-FFF2-40B4-BE49-F238E27FC236}">
+                <a16:creationId xmlns:a16="http://schemas.microsoft.com/office/drawing/2014/main" id="{47709003-B84F-07CC-6E7C-30C048344FCC}"/>
+              </a:ext>
+            </a:extLst>
+          </p:cNvPr>
+          <p:cNvPicPr>
+            <a:picLocks noChangeAspect="1"/>
+          </p:cNvPicPr>
+          <p:nvPr/>
+        </p:nvPicPr>
+        <p:blipFill>
+          <a:blip r:embed="rId3"/>
+          <a:stretch>
+            <a:fillRect/>
+          </a:stretch>
+        </p:blipFill>
+        <p:spPr>
+          <a:xfrm>
+            <a:off x="78177" y="3825731"/>
+            <a:ext cx="11204752" cy="1325562"/>
+          </a:xfrm>
+          <a:prstGeom prst="rect">
+            <a:avLst/>
+          </a:prstGeom>
+        </p:spPr>
+      </p:pic>
+      <p:pic>
+        <p:nvPicPr>
+          <p:cNvPr id="8" name="Billede 7">
+            <a:extLst>
+              <a:ext uri="{FF2B5EF4-FFF2-40B4-BE49-F238E27FC236}">
+                <a16:creationId xmlns:a16="http://schemas.microsoft.com/office/drawing/2014/main" id="{BBBE5BD0-8F42-7486-66FF-B7B9FFC223C7}"/>
+              </a:ext>
+            </a:extLst>
+          </p:cNvPr>
+          <p:cNvPicPr>
+            <a:picLocks noChangeAspect="1"/>
+          </p:cNvPicPr>
+          <p:nvPr/>
+        </p:nvPicPr>
+        <p:blipFill>
+          <a:blip r:embed="rId4"/>
+          <a:stretch>
+            <a:fillRect/>
+          </a:stretch>
+        </p:blipFill>
+        <p:spPr>
+          <a:xfrm>
+            <a:off x="78177" y="5320014"/>
+            <a:ext cx="11155332" cy="619211"/>
           </a:xfrm>
           <a:prstGeom prst="rect">
             <a:avLst/>
@@ -4807,7 +5072,7 @@
     </p:spTree>
     <p:extLst>
       <p:ext uri="{BB962C8B-B14F-4D97-AF65-F5344CB8AC3E}">
-        <p14:creationId xmlns:p14="http://schemas.microsoft.com/office/powerpoint/2010/main" val="547316651"/>
+        <p14:creationId xmlns:p14="http://schemas.microsoft.com/office/powerpoint/2010/main" val="1306872264"/>
       </p:ext>
     </p:extLst>
   </p:cSld>
@@ -4842,7 +5107,7 @@
           <p:cNvPr id="2" name="Titel 1">
             <a:extLst>
               <a:ext uri="{FF2B5EF4-FFF2-40B4-BE49-F238E27FC236}">
-                <a16:creationId xmlns:a16="http://schemas.microsoft.com/office/drawing/2014/main" id="{C7981F0E-63FC-E7BF-0612-78BA5B79F85F}"/>
+                <a16:creationId xmlns:a16="http://schemas.microsoft.com/office/drawing/2014/main" id="{38752860-6311-C86E-476A-98C4FED77888}"/>
               </a:ext>
             </a:extLst>
           </p:cNvPr>
@@ -4860,7 +5125,7 @@
           <a:p>
             <a:r>
               <a:rPr lang="da-DK" dirty="0"/>
-              <a:t>Konklusion</a:t>
+              <a:t>Testresultater</a:t>
             </a:r>
           </a:p>
         </p:txBody>
@@ -4870,7 +5135,7 @@
           <p:cNvPr id="3" name="Pladsholder til indhold 2">
             <a:extLst>
               <a:ext uri="{FF2B5EF4-FFF2-40B4-BE49-F238E27FC236}">
-                <a16:creationId xmlns:a16="http://schemas.microsoft.com/office/drawing/2014/main" id="{2FA8A259-BC4B-6CC9-3854-F18D73D774AA}"/>
+                <a16:creationId xmlns:a16="http://schemas.microsoft.com/office/drawing/2014/main" id="{A1432D90-DD4C-2C49-665F-959EBD0CF837}"/>
               </a:ext>
             </a:extLst>
           </p:cNvPr>
@@ -4881,95 +5146,48 @@
             <p:ph idx="1"/>
           </p:nvPr>
         </p:nvSpPr>
-        <p:spPr/>
+        <p:spPr>
+          <a:xfrm>
+            <a:off x="1261872" y="1828800"/>
+            <a:ext cx="3683754" cy="4351337"/>
+          </a:xfrm>
+        </p:spPr>
         <p:txBody>
           <a:bodyPr/>
           <a:lstStyle/>
           <a:p>
             <a:r>
               <a:rPr lang="da-DK" dirty="0"/>
-              <a:t>Kode:</a:t>
-            </a:r>
-          </a:p>
-          <a:p>
-            <a:pPr lvl="1"/>
+              <a:t>8 unit tests.</a:t>
+            </a:r>
+          </a:p>
+          <a:p>
             <a:r>
               <a:rPr lang="da-DK" dirty="0"/>
-              <a:t>Velstruktureret.</a:t>
-            </a:r>
-          </a:p>
-          <a:p>
-            <a:pPr lvl="1"/>
+              <a:t>4 integrationstests</a:t>
+            </a:r>
+          </a:p>
+          <a:p>
             <a:r>
               <a:rPr lang="da-DK" dirty="0"/>
-              <a:t>Let forståelig.</a:t>
-            </a:r>
-          </a:p>
-          <a:p>
-            <a:pPr lvl="1"/>
+              <a:t>Unit tests fejler grundet kodefejl</a:t>
+            </a:r>
+          </a:p>
+          <a:p>
             <a:r>
               <a:rPr lang="da-DK" dirty="0"/>
-              <a:t>Godt dokumenteret.</a:t>
-            </a:r>
-          </a:p>
-          <a:p>
-            <a:r>
-              <a:rPr lang="da-DK" dirty="0"/>
-              <a:t>Fejl og mangler.</a:t>
-            </a:r>
-          </a:p>
-          <a:p>
-            <a:pPr lvl="1"/>
-            <a:r>
-              <a:rPr lang="da-DK" dirty="0"/>
-              <a:t>Linje 141, </a:t>
-            </a:r>
-            <a:r>
-              <a:rPr lang="da-DK" dirty="0" err="1"/>
-              <a:t>download_task</a:t>
-            </a:r>
-            <a:r>
-              <a:rPr lang="da-DK" dirty="0"/>
-              <a:t>: </a:t>
-            </a:r>
-            <a:r>
-              <a:rPr lang="da-DK" dirty="0" err="1"/>
-              <a:t>NoneType</a:t>
-            </a:r>
-            <a:r>
-              <a:rPr lang="da-DK" dirty="0"/>
-              <a:t> bliver ikke håndteret ordentligt.</a:t>
-            </a:r>
-          </a:p>
-          <a:p>
-            <a:pPr lvl="1"/>
-            <a:r>
-              <a:rPr lang="da-DK" dirty="0"/>
-              <a:t>Linje 129, </a:t>
-            </a:r>
-            <a:r>
-              <a:rPr lang="da-DK" dirty="0" err="1"/>
-              <a:t>download_task</a:t>
-            </a:r>
-            <a:r>
-              <a:rPr lang="da-DK" dirty="0"/>
-              <a:t>: Skrivning til rapport fejler, da der ikke er defineret noget </a:t>
-            </a:r>
-            <a:r>
-              <a:rPr lang="da-DK" dirty="0" err="1"/>
-              <a:t>report_writer</a:t>
-            </a:r>
-            <a:r>
-              <a:rPr lang="da-DK" dirty="0"/>
-              <a:t> objekt. </a:t>
-            </a:r>
+              <a:t>Integrationstests fejler grundet samme fejl</a:t>
+            </a:r>
+          </a:p>
+          <a:p>
+            <a:endParaRPr lang="da-DK" dirty="0"/>
           </a:p>
         </p:txBody>
       </p:sp>
     </p:spTree>
     <p:extLst>
       <p:ext uri="{BB962C8B-B14F-4D97-AF65-F5344CB8AC3E}">
-        <p14:creationId xmlns:p14="http://schemas.microsoft.com/office/powerpoint/2010/main" val="3649170967"/>
+        <p14:creationId xmlns:p14="http://schemas.microsoft.com/office/powerpoint/2010/main" val="547316651"/>
       </p:ext>
     </p:extLst>
   </p:cSld>
@@ -5004,7 +5222,7 @@
           <p:cNvPr id="2" name="Titel 1">
             <a:extLst>
               <a:ext uri="{FF2B5EF4-FFF2-40B4-BE49-F238E27FC236}">
-                <a16:creationId xmlns:a16="http://schemas.microsoft.com/office/drawing/2014/main" id="{CFE4E1AA-BCF8-467C-3CD8-56DE8896EF7C}"/>
+                <a16:creationId xmlns:a16="http://schemas.microsoft.com/office/drawing/2014/main" id="{F4F7AD28-432D-C57D-DFFB-5AECBBB38611}"/>
               </a:ext>
             </a:extLst>
           </p:cNvPr>
@@ -5020,88 +5238,248 @@
           <a:bodyPr/>
           <a:lstStyle/>
           <a:p>
-            <a:r>
-              <a:rPr lang="da-DK" dirty="0"/>
-              <a:t>Tak for denne gang</a:t>
-            </a:r>
-          </a:p>
-        </p:txBody>
-      </p:sp>
-      <p:pic>
-        <p:nvPicPr>
-          <p:cNvPr id="5" name="Pladsholder til indhold 4" descr="Et billede, der indeholder tekst, person, Små til mellemstore katte, smil&#10;&#10;AI-genereret indhold kan være ukorrekt.">
+            <a:endParaRPr lang="da-DK" dirty="0"/>
+          </a:p>
+        </p:txBody>
+      </p:sp>
+      <p:sp>
+        <p:nvSpPr>
+          <p:cNvPr id="3" name="Pladsholder til indhold 2">
             <a:extLst>
               <a:ext uri="{FF2B5EF4-FFF2-40B4-BE49-F238E27FC236}">
-                <a16:creationId xmlns:a16="http://schemas.microsoft.com/office/drawing/2014/main" id="{1579E88C-699E-CD58-888C-49D53E41F960}"/>
+                <a16:creationId xmlns:a16="http://schemas.microsoft.com/office/drawing/2014/main" id="{A5B5F65E-02BA-DF00-BAC9-1F32A7B1775F}"/>
               </a:ext>
             </a:extLst>
           </p:cNvPr>
-          <p:cNvPicPr>
-            <a:picLocks noGrp="1" noChangeAspect="1"/>
-          </p:cNvPicPr>
+          <p:cNvSpPr>
+            <a:spLocks noGrp="1"/>
+          </p:cNvSpPr>
           <p:nvPr>
             <p:ph idx="1"/>
           </p:nvPr>
-        </p:nvPicPr>
-        <p:blipFill>
-          <a:blip r:embed="rId2">
-            <a:extLst>
-              <a:ext uri="{28A0092B-C50C-407E-A947-70E740481C1C}">
-                <a14:useLocalDpi xmlns:a14="http://schemas.microsoft.com/office/drawing/2010/main" val="0"/>
-              </a:ext>
-            </a:extLst>
-          </a:blip>
-          <a:stretch>
-            <a:fillRect/>
-          </a:stretch>
-        </p:blipFill>
-        <p:spPr>
-          <a:xfrm>
-            <a:off x="325721" y="1868129"/>
-            <a:ext cx="6318196" cy="4351338"/>
-          </a:xfrm>
-        </p:spPr>
-      </p:pic>
-      <p:pic>
-        <p:nvPicPr>
-          <p:cNvPr id="7" name="Billede 6" descr="Et billede, der indeholder tekst, tegneserie, køretøj, Fiktiv figur&#10;&#10;AI-genereret indhold kan være ukorrekt.">
+        </p:nvSpPr>
+        <p:spPr/>
+        <p:txBody>
+          <a:bodyPr/>
+          <a:lstStyle/>
+          <a:p>
+            <a:endParaRPr lang="da-DK" dirty="0"/>
+          </a:p>
+        </p:txBody>
+      </p:sp>
+      <p:graphicFrame>
+        <p:nvGraphicFramePr>
+          <p:cNvPr id="5" name="Objekt 4">
             <a:extLst>
               <a:ext uri="{FF2B5EF4-FFF2-40B4-BE49-F238E27FC236}">
-                <a16:creationId xmlns:a16="http://schemas.microsoft.com/office/drawing/2014/main" id="{F728B190-AEAC-5663-EA35-E6FC04C25DCD}"/>
+                <a16:creationId xmlns:a16="http://schemas.microsoft.com/office/drawing/2014/main" id="{58E5A834-524E-5341-942B-FD319E893491}"/>
               </a:ext>
             </a:extLst>
           </p:cNvPr>
-          <p:cNvPicPr>
-            <a:picLocks noChangeAspect="1"/>
-          </p:cNvPicPr>
-          <p:nvPr/>
-        </p:nvPicPr>
-        <p:blipFill>
-          <a:blip r:embed="rId3">
-            <a:extLst>
-              <a:ext uri="{28A0092B-C50C-407E-A947-70E740481C1C}">
-                <a14:useLocalDpi xmlns:a14="http://schemas.microsoft.com/office/drawing/2010/main" val="0"/>
-              </a:ext>
-            </a:extLst>
-          </a:blip>
-          <a:stretch>
-            <a:fillRect/>
-          </a:stretch>
-        </p:blipFill>
-        <p:spPr>
-          <a:xfrm>
-            <a:off x="6722575" y="1868129"/>
-            <a:ext cx="4458023" cy="4513288"/>
-          </a:xfrm>
-          <a:prstGeom prst="rect">
-            <a:avLst/>
-          </a:prstGeom>
-        </p:spPr>
-      </p:pic>
+          <p:cNvGraphicFramePr>
+            <a:graphicFrameLocks noChangeAspect="1"/>
+          </p:cNvGraphicFramePr>
+          <p:nvPr>
+            <p:extLst>
+              <p:ext uri="{D42A27DB-BD31-4B8C-83A1-F6EECF244321}">
+                <p14:modId xmlns:p14="http://schemas.microsoft.com/office/powerpoint/2010/main" val="2363674792"/>
+              </p:ext>
+            </p:extLst>
+          </p:nvPr>
+        </p:nvGraphicFramePr>
+        <p:xfrm>
+          <a:off x="1042416" y="384268"/>
+          <a:ext cx="8814815" cy="5753008"/>
+        </p:xfrm>
+        <a:graphic>
+          <a:graphicData uri="http://schemas.openxmlformats.org/presentationml/2006/ole">
+            <mc:AlternateContent xmlns:mc="http://schemas.openxmlformats.org/markup-compatibility/2006">
+              <mc:Choice xmlns:v="urn:schemas-microsoft-com:vml" Requires="v">
+                <p:oleObj name="Document" r:id="rId2" imgW="6120457" imgH="8126932" progId="Word.Document.12">
+                  <p:embed/>
+                </p:oleObj>
+              </mc:Choice>
+              <mc:Fallback>
+                <p:oleObj name="Document" r:id="rId2" imgW="6120457" imgH="8126932" progId="Word.Document.12">
+                  <p:embed/>
+                  <p:pic>
+                    <p:nvPicPr>
+                      <p:cNvPr id="0" name=""/>
+                      <p:cNvPicPr/>
+                      <p:nvPr/>
+                    </p:nvPicPr>
+                    <p:blipFill>
+                      <a:blip r:embed="rId3"/>
+                      <a:stretch>
+                        <a:fillRect/>
+                      </a:stretch>
+                    </p:blipFill>
+                    <p:spPr>
+                      <a:xfrm>
+                        <a:off x="1042416" y="384268"/>
+                        <a:ext cx="8814815" cy="5753008"/>
+                      </a:xfrm>
+                      <a:prstGeom prst="rect">
+                        <a:avLst/>
+                      </a:prstGeom>
+                    </p:spPr>
+                  </p:pic>
+                </p:oleObj>
+              </mc:Fallback>
+            </mc:AlternateContent>
+          </a:graphicData>
+        </a:graphic>
+      </p:graphicFrame>
     </p:spTree>
     <p:extLst>
       <p:ext uri="{BB962C8B-B14F-4D97-AF65-F5344CB8AC3E}">
-        <p14:creationId xmlns:p14="http://schemas.microsoft.com/office/powerpoint/2010/main" val="3102309526"/>
+        <p14:creationId xmlns:p14="http://schemas.microsoft.com/office/powerpoint/2010/main" val="2994112397"/>
+      </p:ext>
+    </p:extLst>
+  </p:cSld>
+  <p:clrMapOvr>
+    <a:masterClrMapping/>
+  </p:clrMapOvr>
+  <p:transition spd="med">
+    <p:pull/>
+  </p:transition>
+</p:sld>
+</file>
+
+<file path=ppt/slides/slide9.xml><?xml version="1.0" encoding="utf-8"?>
+<p:sld xmlns:a="http://schemas.openxmlformats.org/drawingml/2006/main" xmlns:r="http://schemas.openxmlformats.org/officeDocument/2006/relationships" xmlns:p="http://schemas.openxmlformats.org/presentationml/2006/main">
+  <p:cSld>
+    <p:spTree>
+      <p:nvGrpSpPr>
+        <p:cNvPr id="1" name=""/>
+        <p:cNvGrpSpPr/>
+        <p:nvPr/>
+      </p:nvGrpSpPr>
+      <p:grpSpPr>
+        <a:xfrm>
+          <a:off x="0" y="0"/>
+          <a:ext cx="0" cy="0"/>
+          <a:chOff x="0" y="0"/>
+          <a:chExt cx="0" cy="0"/>
+        </a:xfrm>
+      </p:grpSpPr>
+      <p:sp>
+        <p:nvSpPr>
+          <p:cNvPr id="2" name="Titel 1">
+            <a:extLst>
+              <a:ext uri="{FF2B5EF4-FFF2-40B4-BE49-F238E27FC236}">
+                <a16:creationId xmlns:a16="http://schemas.microsoft.com/office/drawing/2014/main" id="{018D5FDC-7D37-BBA0-D380-70A7894F4120}"/>
+              </a:ext>
+            </a:extLst>
+          </p:cNvPr>
+          <p:cNvSpPr>
+            <a:spLocks noGrp="1"/>
+          </p:cNvSpPr>
+          <p:nvPr>
+            <p:ph type="title"/>
+          </p:nvPr>
+        </p:nvSpPr>
+        <p:spPr/>
+        <p:txBody>
+          <a:bodyPr/>
+          <a:lstStyle/>
+          <a:p>
+            <a:endParaRPr lang="da-DK"/>
+          </a:p>
+        </p:txBody>
+      </p:sp>
+      <p:sp>
+        <p:nvSpPr>
+          <p:cNvPr id="3" name="Pladsholder til indhold 2">
+            <a:extLst>
+              <a:ext uri="{FF2B5EF4-FFF2-40B4-BE49-F238E27FC236}">
+                <a16:creationId xmlns:a16="http://schemas.microsoft.com/office/drawing/2014/main" id="{8130F96E-3690-07A3-D7BC-7F9411870DD9}"/>
+              </a:ext>
+            </a:extLst>
+          </p:cNvPr>
+          <p:cNvSpPr>
+            <a:spLocks noGrp="1"/>
+          </p:cNvSpPr>
+          <p:nvPr>
+            <p:ph idx="1"/>
+          </p:nvPr>
+        </p:nvSpPr>
+        <p:spPr/>
+        <p:txBody>
+          <a:bodyPr/>
+          <a:lstStyle/>
+          <a:p>
+            <a:endParaRPr lang="da-DK" dirty="0"/>
+          </a:p>
+        </p:txBody>
+      </p:sp>
+      <p:graphicFrame>
+        <p:nvGraphicFramePr>
+          <p:cNvPr id="5" name="Objekt 4">
+            <a:extLst>
+              <a:ext uri="{FF2B5EF4-FFF2-40B4-BE49-F238E27FC236}">
+                <a16:creationId xmlns:a16="http://schemas.microsoft.com/office/drawing/2014/main" id="{25657058-A15B-F56A-5BFA-446CDE158E14}"/>
+              </a:ext>
+            </a:extLst>
+          </p:cNvPr>
+          <p:cNvGraphicFramePr>
+            <a:graphicFrameLocks noChangeAspect="1"/>
+          </p:cNvGraphicFramePr>
+          <p:nvPr>
+            <p:extLst>
+              <p:ext uri="{D42A27DB-BD31-4B8C-83A1-F6EECF244321}">
+                <p14:modId xmlns:p14="http://schemas.microsoft.com/office/powerpoint/2010/main" val="57814726"/>
+              </p:ext>
+            </p:extLst>
+          </p:nvPr>
+        </p:nvGraphicFramePr>
+        <p:xfrm>
+          <a:off x="1773936" y="719138"/>
+          <a:ext cx="7616952" cy="5418137"/>
+        </p:xfrm>
+        <a:graphic>
+          <a:graphicData uri="http://schemas.openxmlformats.org/presentationml/2006/ole">
+            <mc:AlternateContent xmlns:mc="http://schemas.openxmlformats.org/markup-compatibility/2006">
+              <mc:Choice xmlns:v="urn:schemas-microsoft-com:vml" Requires="v">
+                <p:oleObj name="Document" r:id="rId2" imgW="6120457" imgH="7945845" progId="Word.Document.12">
+                  <p:embed/>
+                </p:oleObj>
+              </mc:Choice>
+              <mc:Fallback>
+                <p:oleObj name="Document" r:id="rId2" imgW="6120457" imgH="7945845" progId="Word.Document.12">
+                  <p:embed/>
+                  <p:pic>
+                    <p:nvPicPr>
+                      <p:cNvPr id="0" name=""/>
+                      <p:cNvPicPr/>
+                      <p:nvPr/>
+                    </p:nvPicPr>
+                    <p:blipFill>
+                      <a:blip r:embed="rId3"/>
+                      <a:stretch>
+                        <a:fillRect/>
+                      </a:stretch>
+                    </p:blipFill>
+                    <p:spPr>
+                      <a:xfrm>
+                        <a:off x="1773936" y="719138"/>
+                        <a:ext cx="7616952" cy="5418137"/>
+                      </a:xfrm>
+                      <a:prstGeom prst="rect">
+                        <a:avLst/>
+                      </a:prstGeom>
+                    </p:spPr>
+                  </p:pic>
+                </p:oleObj>
+              </mc:Fallback>
+            </mc:AlternateContent>
+          </a:graphicData>
+        </a:graphic>
+      </p:graphicFrame>
+    </p:spTree>
+    <p:extLst>
+      <p:ext uri="{BB962C8B-B14F-4D97-AF65-F5344CB8AC3E}">
+        <p14:creationId xmlns:p14="http://schemas.microsoft.com/office/powerpoint/2010/main" val="3447447258"/>
       </p:ext>
     </p:extLst>
   </p:cSld>

</xml_diff>